<commit_message>
added fixation cross to instruction on powerpoints
</commit_message>
<xml_diff>
--- a/Instruction_de_left_go.pptx
+++ b/Instruction_de_left_go.pptx
@@ -302,7 +302,7 @@
           <a:p>
             <a:fld id="{F32644F4-EB0D-4C98-BE1C-61E67B517F6C}" type="datetimeFigureOut">
               <a:rPr lang="de-CH" smtClean="0"/>
-              <a:t>11.09.2019</a:t>
+              <a:t>13.09.2019</a:t>
             </a:fld>
             <a:endParaRPr lang="de-CH"/>
           </a:p>
@@ -472,7 +472,7 @@
           <a:p>
             <a:fld id="{F32644F4-EB0D-4C98-BE1C-61E67B517F6C}" type="datetimeFigureOut">
               <a:rPr lang="de-CH" smtClean="0"/>
-              <a:t>11.09.2019</a:t>
+              <a:t>13.09.2019</a:t>
             </a:fld>
             <a:endParaRPr lang="de-CH"/>
           </a:p>
@@ -652,7 +652,7 @@
           <a:p>
             <a:fld id="{F32644F4-EB0D-4C98-BE1C-61E67B517F6C}" type="datetimeFigureOut">
               <a:rPr lang="de-CH" smtClean="0"/>
-              <a:t>11.09.2019</a:t>
+              <a:t>13.09.2019</a:t>
             </a:fld>
             <a:endParaRPr lang="de-CH"/>
           </a:p>
@@ -822,7 +822,7 @@
           <a:p>
             <a:fld id="{F32644F4-EB0D-4C98-BE1C-61E67B517F6C}" type="datetimeFigureOut">
               <a:rPr lang="de-CH" smtClean="0"/>
-              <a:t>11.09.2019</a:t>
+              <a:t>13.09.2019</a:t>
             </a:fld>
             <a:endParaRPr lang="de-CH"/>
           </a:p>
@@ -1068,7 +1068,7 @@
           <a:p>
             <a:fld id="{F32644F4-EB0D-4C98-BE1C-61E67B517F6C}" type="datetimeFigureOut">
               <a:rPr lang="de-CH" smtClean="0"/>
-              <a:t>11.09.2019</a:t>
+              <a:t>13.09.2019</a:t>
             </a:fld>
             <a:endParaRPr lang="de-CH"/>
           </a:p>
@@ -1356,7 +1356,7 @@
           <a:p>
             <a:fld id="{F32644F4-EB0D-4C98-BE1C-61E67B517F6C}" type="datetimeFigureOut">
               <a:rPr lang="de-CH" smtClean="0"/>
-              <a:t>11.09.2019</a:t>
+              <a:t>13.09.2019</a:t>
             </a:fld>
             <a:endParaRPr lang="de-CH"/>
           </a:p>
@@ -1778,7 +1778,7 @@
           <a:p>
             <a:fld id="{F32644F4-EB0D-4C98-BE1C-61E67B517F6C}" type="datetimeFigureOut">
               <a:rPr lang="de-CH" smtClean="0"/>
-              <a:t>11.09.2019</a:t>
+              <a:t>13.09.2019</a:t>
             </a:fld>
             <a:endParaRPr lang="de-CH"/>
           </a:p>
@@ -1896,7 +1896,7 @@
           <a:p>
             <a:fld id="{F32644F4-EB0D-4C98-BE1C-61E67B517F6C}" type="datetimeFigureOut">
               <a:rPr lang="de-CH" smtClean="0"/>
-              <a:t>11.09.2019</a:t>
+              <a:t>13.09.2019</a:t>
             </a:fld>
             <a:endParaRPr lang="de-CH"/>
           </a:p>
@@ -1991,7 +1991,7 @@
           <a:p>
             <a:fld id="{F32644F4-EB0D-4C98-BE1C-61E67B517F6C}" type="datetimeFigureOut">
               <a:rPr lang="de-CH" smtClean="0"/>
-              <a:t>11.09.2019</a:t>
+              <a:t>13.09.2019</a:t>
             </a:fld>
             <a:endParaRPr lang="de-CH"/>
           </a:p>
@@ -2268,7 +2268,7 @@
           <a:p>
             <a:fld id="{F32644F4-EB0D-4C98-BE1C-61E67B517F6C}" type="datetimeFigureOut">
               <a:rPr lang="de-CH" smtClean="0"/>
-              <a:t>11.09.2019</a:t>
+              <a:t>13.09.2019</a:t>
             </a:fld>
             <a:endParaRPr lang="de-CH"/>
           </a:p>
@@ -2525,7 +2525,7 @@
           <a:p>
             <a:fld id="{F32644F4-EB0D-4C98-BE1C-61E67B517F6C}" type="datetimeFigureOut">
               <a:rPr lang="de-CH" smtClean="0"/>
-              <a:t>11.09.2019</a:t>
+              <a:t>13.09.2019</a:t>
             </a:fld>
             <a:endParaRPr lang="de-CH"/>
           </a:p>
@@ -2738,7 +2738,7 @@
           <a:p>
             <a:fld id="{F32644F4-EB0D-4C98-BE1C-61E67B517F6C}" type="datetimeFigureOut">
               <a:rPr lang="de-CH" smtClean="0"/>
-              <a:t>11.09.2019</a:t>
+              <a:t>13.09.2019</a:t>
             </a:fld>
             <a:endParaRPr lang="de-CH"/>
           </a:p>
@@ -3243,7 +3243,7 @@
         </p:nvSpPr>
         <p:spPr>
           <a:xfrm>
-            <a:off x="5724512" y="2230690"/>
+            <a:off x="6243501" y="2230690"/>
             <a:ext cx="838200" cy="838200"/>
           </a:xfrm>
           <a:prstGeom prst="diamond">
@@ -3297,7 +3297,7 @@
         </p:nvSpPr>
         <p:spPr>
           <a:xfrm>
-            <a:off x="5686412" y="2418957"/>
+            <a:off x="6205401" y="2418957"/>
             <a:ext cx="190500" cy="461665"/>
           </a:xfrm>
           <a:prstGeom prst="rect">
@@ -3656,7 +3656,7 @@
         </p:nvSpPr>
         <p:spPr>
           <a:xfrm>
-            <a:off x="5729411" y="4419600"/>
+            <a:off x="6248400" y="4419600"/>
             <a:ext cx="838200" cy="838200"/>
           </a:xfrm>
           <a:prstGeom prst="diamond">
@@ -3710,7 +3710,7 @@
         </p:nvSpPr>
         <p:spPr>
           <a:xfrm>
-            <a:off x="6453311" y="4607867"/>
+            <a:off x="6972300" y="4607867"/>
             <a:ext cx="190500" cy="461665"/>
           </a:xfrm>
           <a:prstGeom prst="rect">
@@ -4429,6 +4429,96 @@
           </a:p>
         </p:txBody>
       </p:sp>
+      <p:pic>
+        <p:nvPicPr>
+          <p:cNvPr id="20" name="Grafik 19">
+            <a:extLst>
+              <a:ext uri="{FF2B5EF4-FFF2-40B4-BE49-F238E27FC236}">
+                <a16:creationId xmlns:a16="http://schemas.microsoft.com/office/drawing/2014/main" id="{4C0DE05B-21C7-44F2-87A8-9CA7BD2C1502}"/>
+              </a:ext>
+            </a:extLst>
+          </p:cNvPr>
+          <p:cNvPicPr>
+            <a:picLocks noChangeAspect="1"/>
+          </p:cNvPicPr>
+          <p:nvPr/>
+        </p:nvPicPr>
+        <p:blipFill>
+          <a:blip r:embed="rId2"/>
+          <a:stretch>
+            <a:fillRect/>
+          </a:stretch>
+        </p:blipFill>
+        <p:spPr>
+          <a:xfrm>
+            <a:off x="5183886" y="4435525"/>
+            <a:ext cx="900176" cy="712639"/>
+          </a:xfrm>
+          <a:prstGeom prst="rect">
+            <a:avLst/>
+          </a:prstGeom>
+        </p:spPr>
+      </p:pic>
+      <p:pic>
+        <p:nvPicPr>
+          <p:cNvPr id="24" name="Grafik 23">
+            <a:extLst>
+              <a:ext uri="{FF2B5EF4-FFF2-40B4-BE49-F238E27FC236}">
+                <a16:creationId xmlns:a16="http://schemas.microsoft.com/office/drawing/2014/main" id="{ED558390-71F4-4068-806C-5BFC90655F5B}"/>
+              </a:ext>
+            </a:extLst>
+          </p:cNvPr>
+          <p:cNvPicPr>
+            <a:picLocks noChangeAspect="1"/>
+          </p:cNvPicPr>
+          <p:nvPr/>
+        </p:nvPicPr>
+        <p:blipFill>
+          <a:blip r:embed="rId2"/>
+          <a:stretch>
+            <a:fillRect/>
+          </a:stretch>
+        </p:blipFill>
+        <p:spPr>
+          <a:xfrm>
+            <a:off x="5183886" y="2300278"/>
+            <a:ext cx="900176" cy="712639"/>
+          </a:xfrm>
+          <a:prstGeom prst="rect">
+            <a:avLst/>
+          </a:prstGeom>
+        </p:spPr>
+      </p:pic>
+      <p:pic>
+        <p:nvPicPr>
+          <p:cNvPr id="25" name="Grafik 24">
+            <a:extLst>
+              <a:ext uri="{FF2B5EF4-FFF2-40B4-BE49-F238E27FC236}">
+                <a16:creationId xmlns:a16="http://schemas.microsoft.com/office/drawing/2014/main" id="{546BC0F7-9FBF-4934-9443-D1284B9931D9}"/>
+              </a:ext>
+            </a:extLst>
+          </p:cNvPr>
+          <p:cNvPicPr>
+            <a:picLocks noChangeAspect="1"/>
+          </p:cNvPicPr>
+          <p:nvPr/>
+        </p:nvPicPr>
+        <p:blipFill>
+          <a:blip r:embed="rId2"/>
+          <a:stretch>
+            <a:fillRect/>
+          </a:stretch>
+        </p:blipFill>
+        <p:spPr>
+          <a:xfrm>
+            <a:off x="5241876" y="324653"/>
+            <a:ext cx="900176" cy="712639"/>
+          </a:xfrm>
+          <a:prstGeom prst="rect">
+            <a:avLst/>
+          </a:prstGeom>
+        </p:spPr>
+      </p:pic>
     </p:spTree>
     <p:extLst>
       <p:ext uri="{BB962C8B-B14F-4D97-AF65-F5344CB8AC3E}">

</xml_diff>